<commit_message>
pdfs of lecture slides
</commit_message>
<xml_diff>
--- a/Lecture slides/Lecture 3 Estimating Abundance.pptx
+++ b/Lecture slides/Lecture 3 Estimating Abundance.pptx
@@ -5,14 +5,15 @@
     <p:sldMasterId id="2147483648" r:id="rId1"/>
   </p:sldMasterIdLst>
   <p:notesMasterIdLst>
-    <p:notesMasterId r:id="rId7"/>
+    <p:notesMasterId r:id="rId8"/>
   </p:notesMasterIdLst>
   <p:sldIdLst>
-    <p:sldId id="256" r:id="rId2"/>
-    <p:sldId id="258" r:id="rId3"/>
-    <p:sldId id="257" r:id="rId4"/>
-    <p:sldId id="259" r:id="rId5"/>
-    <p:sldId id="260" r:id="rId6"/>
+    <p:sldId id="258" r:id="rId2"/>
+    <p:sldId id="257" r:id="rId3"/>
+    <p:sldId id="259" r:id="rId4"/>
+    <p:sldId id="260" r:id="rId5"/>
+    <p:sldId id="262" r:id="rId6"/>
+    <p:sldId id="261" r:id="rId7"/>
   </p:sldIdLst>
   <p:sldSz cx="9144000" cy="6858000" type="screen4x3"/>
   <p:notesSz cx="6858000" cy="9144000"/>
@@ -196,7 +197,7 @@
           <a:p>
             <a:fld id="{FAF65FDB-8409-304E-BB04-FE28A518302B}" type="datetimeFigureOut">
               <a:rPr lang="en-US" smtClean="0"/>
-              <a:t>19-09-12</a:t>
+              <a:t>19-09-17</a:t>
             </a:fld>
             <a:endParaRPr lang="en-US"/>
           </a:p>
@@ -560,7 +561,7 @@
           <a:p>
             <a:fld id="{3525EB27-9417-4849-B259-DD800127096E}" type="slidenum">
               <a:rPr lang="en-US" smtClean="0"/>
-              <a:t>4</a:t>
+              <a:t>3</a:t>
             </a:fld>
             <a:endParaRPr lang="en-US"/>
           </a:p>
@@ -760,7 +761,7 @@
           <a:p>
             <a:fld id="{62408EB8-6542-8441-AE9E-4D08C88EEE39}" type="datetimeFigureOut">
               <a:rPr lang="en-US" smtClean="0"/>
-              <a:t>19-09-12</a:t>
+              <a:t>19-09-17</a:t>
             </a:fld>
             <a:endParaRPr lang="en-US"/>
           </a:p>
@@ -930,7 +931,7 @@
           <a:p>
             <a:fld id="{62408EB8-6542-8441-AE9E-4D08C88EEE39}" type="datetimeFigureOut">
               <a:rPr lang="en-US" smtClean="0"/>
-              <a:t>19-09-12</a:t>
+              <a:t>19-09-17</a:t>
             </a:fld>
             <a:endParaRPr lang="en-US"/>
           </a:p>
@@ -1110,7 +1111,7 @@
           <a:p>
             <a:fld id="{62408EB8-6542-8441-AE9E-4D08C88EEE39}" type="datetimeFigureOut">
               <a:rPr lang="en-US" smtClean="0"/>
-              <a:t>19-09-12</a:t>
+              <a:t>19-09-17</a:t>
             </a:fld>
             <a:endParaRPr lang="en-US"/>
           </a:p>
@@ -1280,7 +1281,7 @@
           <a:p>
             <a:fld id="{62408EB8-6542-8441-AE9E-4D08C88EEE39}" type="datetimeFigureOut">
               <a:rPr lang="en-US" smtClean="0"/>
-              <a:t>19-09-12</a:t>
+              <a:t>19-09-17</a:t>
             </a:fld>
             <a:endParaRPr lang="en-US"/>
           </a:p>
@@ -1526,7 +1527,7 @@
           <a:p>
             <a:fld id="{62408EB8-6542-8441-AE9E-4D08C88EEE39}" type="datetimeFigureOut">
               <a:rPr lang="en-US" smtClean="0"/>
-              <a:t>19-09-12</a:t>
+              <a:t>19-09-17</a:t>
             </a:fld>
             <a:endParaRPr lang="en-US"/>
           </a:p>
@@ -1814,7 +1815,7 @@
           <a:p>
             <a:fld id="{62408EB8-6542-8441-AE9E-4D08C88EEE39}" type="datetimeFigureOut">
               <a:rPr lang="en-US" smtClean="0"/>
-              <a:t>19-09-12</a:t>
+              <a:t>19-09-17</a:t>
             </a:fld>
             <a:endParaRPr lang="en-US"/>
           </a:p>
@@ -2236,7 +2237,7 @@
           <a:p>
             <a:fld id="{62408EB8-6542-8441-AE9E-4D08C88EEE39}" type="datetimeFigureOut">
               <a:rPr lang="en-US" smtClean="0"/>
-              <a:t>19-09-12</a:t>
+              <a:t>19-09-17</a:t>
             </a:fld>
             <a:endParaRPr lang="en-US"/>
           </a:p>
@@ -2354,7 +2355,7 @@
           <a:p>
             <a:fld id="{62408EB8-6542-8441-AE9E-4D08C88EEE39}" type="datetimeFigureOut">
               <a:rPr lang="en-US" smtClean="0"/>
-              <a:t>19-09-12</a:t>
+              <a:t>19-09-17</a:t>
             </a:fld>
             <a:endParaRPr lang="en-US"/>
           </a:p>
@@ -2449,7 +2450,7 @@
           <a:p>
             <a:fld id="{62408EB8-6542-8441-AE9E-4D08C88EEE39}" type="datetimeFigureOut">
               <a:rPr lang="en-US" smtClean="0"/>
-              <a:t>19-09-12</a:t>
+              <a:t>19-09-17</a:t>
             </a:fld>
             <a:endParaRPr lang="en-US"/>
           </a:p>
@@ -2726,7 +2727,7 @@
           <a:p>
             <a:fld id="{62408EB8-6542-8441-AE9E-4D08C88EEE39}" type="datetimeFigureOut">
               <a:rPr lang="en-US" smtClean="0"/>
-              <a:t>19-09-12</a:t>
+              <a:t>19-09-17</a:t>
             </a:fld>
             <a:endParaRPr lang="en-US"/>
           </a:p>
@@ -2979,7 +2980,7 @@
           <a:p>
             <a:fld id="{62408EB8-6542-8441-AE9E-4D08C88EEE39}" type="datetimeFigureOut">
               <a:rPr lang="en-US" smtClean="0"/>
-              <a:t>19-09-12</a:t>
+              <a:t>19-09-17</a:t>
             </a:fld>
             <a:endParaRPr lang="en-US"/>
           </a:p>
@@ -3192,7 +3193,7 @@
           <a:p>
             <a:fld id="{62408EB8-6542-8441-AE9E-4D08C88EEE39}" type="datetimeFigureOut">
               <a:rPr lang="en-US" smtClean="0"/>
-              <a:t>19-09-12</a:t>
+              <a:t>19-09-17</a:t>
             </a:fld>
             <a:endParaRPr lang="en-US"/>
           </a:p>
@@ -3569,66 +3570,6 @@
       </p:grpSpPr>
       <p:pic>
         <p:nvPicPr>
-          <p:cNvPr id="4" name="Picture 3" descr="Screen Shot 2019-09-12 at 11.37.51 AM.png"/>
-          <p:cNvPicPr>
-            <a:picLocks noChangeAspect="1"/>
-          </p:cNvPicPr>
-          <p:nvPr/>
-        </p:nvPicPr>
-        <p:blipFill>
-          <a:blip r:embed="rId2">
-            <a:extLst>
-              <a:ext uri="{28A0092B-C50C-407E-A947-70E740481C1C}">
-                <a14:useLocalDpi xmlns:a14="http://schemas.microsoft.com/office/drawing/2010/main" val="0"/>
-              </a:ext>
-            </a:extLst>
-          </a:blip>
-          <a:stretch>
-            <a:fillRect/>
-          </a:stretch>
-        </p:blipFill>
-        <p:spPr>
-          <a:xfrm>
-            <a:off x="685800" y="2374900"/>
-            <a:ext cx="7772400" cy="2108200"/>
-          </a:xfrm>
-          <a:prstGeom prst="rect">
-            <a:avLst/>
-          </a:prstGeom>
-        </p:spPr>
-      </p:pic>
-    </p:spTree>
-    <p:extLst>
-      <p:ext uri="{BB962C8B-B14F-4D97-AF65-F5344CB8AC3E}">
-        <p14:creationId xmlns:p14="http://schemas.microsoft.com/office/powerpoint/2010/main" val="29547958"/>
-      </p:ext>
-    </p:extLst>
-  </p:cSld>
-  <p:clrMapOvr>
-    <a:masterClrMapping/>
-  </p:clrMapOvr>
-</p:sld>
-</file>
-
-<file path=ppt/slides/slide2.xml><?xml version="1.0" encoding="utf-8"?>
-<p:sld xmlns:a="http://schemas.openxmlformats.org/drawingml/2006/main" xmlns:r="http://schemas.openxmlformats.org/officeDocument/2006/relationships" xmlns:p="http://schemas.openxmlformats.org/presentationml/2006/main">
-  <p:cSld>
-    <p:spTree>
-      <p:nvGrpSpPr>
-        <p:cNvPr id="1" name=""/>
-        <p:cNvGrpSpPr/>
-        <p:nvPr/>
-      </p:nvGrpSpPr>
-      <p:grpSpPr>
-        <a:xfrm>
-          <a:off x="0" y="0"/>
-          <a:ext cx="0" cy="0"/>
-          <a:chOff x="0" y="0"/>
-          <a:chExt cx="0" cy="0"/>
-        </a:xfrm>
-      </p:grpSpPr>
-      <p:pic>
-        <p:nvPicPr>
           <p:cNvPr id="4" name="Picture 3" descr="Screen Shot 2019-09-12 at 11.40.43 AM.png"/>
           <p:cNvPicPr>
             <a:picLocks noChangeAspect="1"/>
@@ -3649,7 +3590,7 @@
         </p:blipFill>
         <p:spPr>
           <a:xfrm>
-            <a:off x="1099008" y="416719"/>
+            <a:off x="1099008" y="3151289"/>
             <a:ext cx="5557974" cy="926329"/>
           </a:xfrm>
           <a:prstGeom prst="rect">
@@ -3679,8 +3620,38 @@
         </p:blipFill>
         <p:spPr>
           <a:xfrm>
-            <a:off x="941125" y="2573270"/>
-            <a:ext cx="6825465" cy="1711460"/>
+            <a:off x="1099008" y="4418820"/>
+            <a:ext cx="4988883" cy="1250944"/>
+          </a:xfrm>
+          <a:prstGeom prst="rect">
+            <a:avLst/>
+          </a:prstGeom>
+        </p:spPr>
+      </p:pic>
+      <p:pic>
+        <p:nvPicPr>
+          <p:cNvPr id="6" name="Picture 5" descr="Screen Shot 2019-09-12 at 11.37.51 AM.png"/>
+          <p:cNvPicPr>
+            <a:picLocks noChangeAspect="1"/>
+          </p:cNvPicPr>
+          <p:nvPr/>
+        </p:nvPicPr>
+        <p:blipFill>
+          <a:blip r:embed="rId4">
+            <a:extLst>
+              <a:ext uri="{28A0092B-C50C-407E-A947-70E740481C1C}">
+                <a14:useLocalDpi xmlns:a14="http://schemas.microsoft.com/office/drawing/2010/main" val="0"/>
+              </a:ext>
+            </a:extLst>
+          </a:blip>
+          <a:stretch>
+            <a:fillRect/>
+          </a:stretch>
+        </p:blipFill>
+        <p:spPr>
+          <a:xfrm>
+            <a:off x="466509" y="191864"/>
+            <a:ext cx="7772400" cy="2108200"/>
           </a:xfrm>
           <a:prstGeom prst="rect">
             <a:avLst/>
@@ -3700,7 +3671,7 @@
 </p:sld>
 </file>
 
-<file path=ppt/slides/slide3.xml><?xml version="1.0" encoding="utf-8"?>
+<file path=ppt/slides/slide2.xml><?xml version="1.0" encoding="utf-8"?>
 <p:sld xmlns:a="http://schemas.openxmlformats.org/drawingml/2006/main" xmlns:r="http://schemas.openxmlformats.org/officeDocument/2006/relationships" xmlns:p="http://schemas.openxmlformats.org/presentationml/2006/main">
   <p:cSld>
     <p:spTree>
@@ -3760,7 +3731,7 @@
 </p:sld>
 </file>
 
-<file path=ppt/slides/slide4.xml><?xml version="1.0" encoding="utf-8"?>
+<file path=ppt/slides/slide3.xml><?xml version="1.0" encoding="utf-8"?>
 <p:sld xmlns:a="http://schemas.openxmlformats.org/drawingml/2006/main" xmlns:r="http://schemas.openxmlformats.org/officeDocument/2006/relationships" xmlns:p="http://schemas.openxmlformats.org/presentationml/2006/main">
   <p:cSld>
     <p:spTree>
@@ -4014,7 +3985,7 @@
 </p:sld>
 </file>
 
-<file path=ppt/slides/slide5.xml><?xml version="1.0" encoding="utf-8"?>
+<file path=ppt/slides/slide4.xml><?xml version="1.0" encoding="utf-8"?>
 <p:sld xmlns:a="http://schemas.openxmlformats.org/drawingml/2006/main" xmlns:r="http://schemas.openxmlformats.org/officeDocument/2006/relationships" xmlns:p="http://schemas.openxmlformats.org/presentationml/2006/main">
   <p:cSld>
     <p:spTree>
@@ -4095,6 +4066,150 @@
     <p:extLst>
       <p:ext uri="{BB962C8B-B14F-4D97-AF65-F5344CB8AC3E}">
         <p14:creationId xmlns:p14="http://schemas.microsoft.com/office/powerpoint/2010/main" val="4244356939"/>
+      </p:ext>
+    </p:extLst>
+  </p:cSld>
+  <p:clrMapOvr>
+    <a:masterClrMapping/>
+  </p:clrMapOvr>
+</p:sld>
+</file>
+
+<file path=ppt/slides/slide5.xml><?xml version="1.0" encoding="utf-8"?>
+<p:sld xmlns:a="http://schemas.openxmlformats.org/drawingml/2006/main" xmlns:r="http://schemas.openxmlformats.org/officeDocument/2006/relationships" xmlns:p="http://schemas.openxmlformats.org/presentationml/2006/main">
+  <p:cSld>
+    <p:spTree>
+      <p:nvGrpSpPr>
+        <p:cNvPr id="1" name=""/>
+        <p:cNvGrpSpPr/>
+        <p:nvPr/>
+      </p:nvGrpSpPr>
+      <p:grpSpPr>
+        <a:xfrm>
+          <a:off x="0" y="0"/>
+          <a:ext cx="0" cy="0"/>
+          <a:chOff x="0" y="0"/>
+          <a:chExt cx="0" cy="0"/>
+        </a:xfrm>
+      </p:grpSpPr>
+      <p:pic>
+        <p:nvPicPr>
+          <p:cNvPr id="5" name="Picture 4" descr="Screen Shot 2019-09-17 at 1.30.35 PM.png"/>
+          <p:cNvPicPr>
+            <a:picLocks noChangeAspect="1"/>
+          </p:cNvPicPr>
+          <p:nvPr/>
+        </p:nvPicPr>
+        <p:blipFill>
+          <a:blip r:embed="rId2">
+            <a:extLst>
+              <a:ext uri="{28A0092B-C50C-407E-A947-70E740481C1C}">
+                <a14:useLocalDpi xmlns:a14="http://schemas.microsoft.com/office/drawing/2010/main" val="0"/>
+              </a:ext>
+            </a:extLst>
+          </a:blip>
+          <a:stretch>
+            <a:fillRect/>
+          </a:stretch>
+        </p:blipFill>
+        <p:spPr>
+          <a:xfrm>
+            <a:off x="431800" y="0"/>
+            <a:ext cx="8264985" cy="6858000"/>
+          </a:xfrm>
+          <a:prstGeom prst="rect">
+            <a:avLst/>
+          </a:prstGeom>
+        </p:spPr>
+      </p:pic>
+    </p:spTree>
+    <p:extLst>
+      <p:ext uri="{BB962C8B-B14F-4D97-AF65-F5344CB8AC3E}">
+        <p14:creationId xmlns:p14="http://schemas.microsoft.com/office/powerpoint/2010/main" val="3250843999"/>
+      </p:ext>
+    </p:extLst>
+  </p:cSld>
+  <p:clrMapOvr>
+    <a:masterClrMapping/>
+  </p:clrMapOvr>
+</p:sld>
+</file>
+
+<file path=ppt/slides/slide6.xml><?xml version="1.0" encoding="utf-8"?>
+<p:sld xmlns:a="http://schemas.openxmlformats.org/drawingml/2006/main" xmlns:r="http://schemas.openxmlformats.org/officeDocument/2006/relationships" xmlns:p="http://schemas.openxmlformats.org/presentationml/2006/main">
+  <p:cSld>
+    <p:spTree>
+      <p:nvGrpSpPr>
+        <p:cNvPr id="1" name=""/>
+        <p:cNvGrpSpPr/>
+        <p:nvPr/>
+      </p:nvGrpSpPr>
+      <p:grpSpPr>
+        <a:xfrm>
+          <a:off x="0" y="0"/>
+          <a:ext cx="0" cy="0"/>
+          <a:chOff x="0" y="0"/>
+          <a:chExt cx="0" cy="0"/>
+        </a:xfrm>
+      </p:grpSpPr>
+      <p:pic>
+        <p:nvPicPr>
+          <p:cNvPr id="4" name="Picture 3"/>
+          <p:cNvPicPr>
+            <a:picLocks noChangeAspect="1"/>
+          </p:cNvPicPr>
+          <p:nvPr/>
+        </p:nvPicPr>
+        <p:blipFill>
+          <a:blip r:embed="rId2"/>
+          <a:stretch>
+            <a:fillRect/>
+          </a:stretch>
+        </p:blipFill>
+        <p:spPr>
+          <a:xfrm>
+            <a:off x="1352298" y="2884916"/>
+            <a:ext cx="5555385" cy="3899992"/>
+          </a:xfrm>
+          <a:prstGeom prst="rect">
+            <a:avLst/>
+          </a:prstGeom>
+        </p:spPr>
+      </p:pic>
+      <p:pic>
+        <p:nvPicPr>
+          <p:cNvPr id="5" name="Picture 4" descr="Screen Shot 2019-09-17 at 1.27.00 PM.png"/>
+          <p:cNvPicPr>
+            <a:picLocks noChangeAspect="1"/>
+          </p:cNvPicPr>
+          <p:nvPr/>
+        </p:nvPicPr>
+        <p:blipFill>
+          <a:blip r:embed="rId3">
+            <a:extLst>
+              <a:ext uri="{28A0092B-C50C-407E-A947-70E740481C1C}">
+                <a14:useLocalDpi xmlns:a14="http://schemas.microsoft.com/office/drawing/2010/main" val="0"/>
+              </a:ext>
+            </a:extLst>
+          </a:blip>
+          <a:stretch>
+            <a:fillRect/>
+          </a:stretch>
+        </p:blipFill>
+        <p:spPr>
+          <a:xfrm>
+            <a:off x="749246" y="0"/>
+            <a:ext cx="7145249" cy="2895258"/>
+          </a:xfrm>
+          <a:prstGeom prst="rect">
+            <a:avLst/>
+          </a:prstGeom>
+        </p:spPr>
+      </p:pic>
+    </p:spTree>
+    <p:extLst>
+      <p:ext uri="{BB962C8B-B14F-4D97-AF65-F5344CB8AC3E}">
+        <p14:creationId xmlns:p14="http://schemas.microsoft.com/office/powerpoint/2010/main" val="1608478783"/>
       </p:ext>
     </p:extLst>
   </p:cSld>

</xml_diff>